<commit_message>
Improving to first beta variadic template slides for next lecture
git-svn-id: https://svn.code.sf.net/p/cpp-lects-rus/code/trunk@177 39143b06-f351-456c-9f92-4cd32fad6823
</commit_message>
<xml_diff>
--- a/slides/lec2-4-seq-containers.pptx
+++ b/slides/lec2-4-seq-containers.pptx
@@ -374,7 +374,7 @@
             <a:fld id="{96DFF08F-DC6B-4601-B491-B0F83F6DD2DA}" type="datetimeFigureOut">
               <a:rPr lang="en-US" dirty="0"/>
               <a:pPr/>
-              <a:t>3/1/2017</a:t>
+              <a:t>3/11/2017</a:t>
             </a:fld>
             <a:endParaRPr lang="en-US" dirty="0"/>
           </a:p>
@@ -591,7 +591,7 @@
           <a:p>
             <a:fld id="{96DFF08F-DC6B-4601-B491-B0F83F6DD2DA}" type="datetimeFigureOut">
               <a:rPr lang="en-US" dirty="0"/>
-              <a:t>3/1/2017</a:t>
+              <a:t>3/11/2017</a:t>
             </a:fld>
             <a:endParaRPr lang="en-US" dirty="0"/>
           </a:p>
@@ -766,7 +766,7 @@
           <a:p>
             <a:fld id="{96DFF08F-DC6B-4601-B491-B0F83F6DD2DA}" type="datetimeFigureOut">
               <a:rPr lang="en-US" dirty="0"/>
-              <a:t>3/1/2017</a:t>
+              <a:t>3/11/2017</a:t>
             </a:fld>
             <a:endParaRPr lang="en-US" dirty="0"/>
           </a:p>
@@ -931,7 +931,7 @@
           <a:p>
             <a:fld id="{96DFF08F-DC6B-4601-B491-B0F83F6DD2DA}" type="datetimeFigureOut">
               <a:rPr lang="en-US" dirty="0"/>
-              <a:t>3/1/2017</a:t>
+              <a:t>3/11/2017</a:t>
             </a:fld>
             <a:endParaRPr lang="en-US" dirty="0"/>
           </a:p>
@@ -1177,7 +1177,7 @@
           <a:p>
             <a:fld id="{96DFF08F-DC6B-4601-B491-B0F83F6DD2DA}" type="datetimeFigureOut">
               <a:rPr lang="en-US" dirty="0"/>
-              <a:t>3/1/2017</a:t>
+              <a:t>3/11/2017</a:t>
             </a:fld>
             <a:endParaRPr lang="en-US" dirty="0"/>
           </a:p>
@@ -1495,7 +1495,7 @@
           <a:p>
             <a:fld id="{96DFF08F-DC6B-4601-B491-B0F83F6DD2DA}" type="datetimeFigureOut">
               <a:rPr lang="en-US" dirty="0"/>
-              <a:t>3/1/2017</a:t>
+              <a:t>3/11/2017</a:t>
             </a:fld>
             <a:endParaRPr lang="en-US" dirty="0"/>
           </a:p>
@@ -1914,7 +1914,7 @@
           <a:p>
             <a:fld id="{96DFF08F-DC6B-4601-B491-B0F83F6DD2DA}" type="datetimeFigureOut">
               <a:rPr lang="en-US" dirty="0"/>
-              <a:t>3/1/2017</a:t>
+              <a:t>3/11/2017</a:t>
             </a:fld>
             <a:endParaRPr lang="en-US" dirty="0"/>
           </a:p>
@@ -2027,7 +2027,7 @@
           <a:p>
             <a:fld id="{96DFF08F-DC6B-4601-B491-B0F83F6DD2DA}" type="datetimeFigureOut">
               <a:rPr lang="en-US" dirty="0"/>
-              <a:t>3/1/2017</a:t>
+              <a:t>3/11/2017</a:t>
             </a:fld>
             <a:endParaRPr lang="en-US" dirty="0"/>
           </a:p>
@@ -2117,7 +2117,7 @@
           <a:p>
             <a:fld id="{96DFF08F-DC6B-4601-B491-B0F83F6DD2DA}" type="datetimeFigureOut">
               <a:rPr lang="en-US" dirty="0"/>
-              <a:t>3/1/2017</a:t>
+              <a:t>3/11/2017</a:t>
             </a:fld>
             <a:endParaRPr lang="en-US" dirty="0"/>
           </a:p>
@@ -2402,7 +2402,7 @@
           <a:p>
             <a:fld id="{96DFF08F-DC6B-4601-B491-B0F83F6DD2DA}" type="datetimeFigureOut">
               <a:rPr lang="en-US" dirty="0"/>
-              <a:t>3/1/2017</a:t>
+              <a:t>3/11/2017</a:t>
             </a:fld>
             <a:endParaRPr lang="en-US" dirty="0"/>
           </a:p>
@@ -2669,7 +2669,7 @@
           <a:p>
             <a:fld id="{96DFF08F-DC6B-4601-B491-B0F83F6DD2DA}" type="datetimeFigureOut">
               <a:rPr lang="en-US" dirty="0"/>
-              <a:t>3/1/2017</a:t>
+              <a:t>3/11/2017</a:t>
             </a:fld>
             <a:endParaRPr lang="en-US" dirty="0"/>
           </a:p>
@@ -2918,7 +2918,7 @@
             <a:fld id="{96DFF08F-DC6B-4601-B491-B0F83F6DD2DA}" type="datetimeFigureOut">
               <a:rPr lang="en-US" dirty="0"/>
               <a:pPr/>
-              <a:t>3/1/2017</a:t>
+              <a:t>3/11/2017</a:t>
             </a:fld>
             <a:endParaRPr lang="en-US" dirty="0"/>
           </a:p>
@@ -5056,13 +5056,7 @@
               <a:rPr lang="ru-RU" smtClean="0">
                 <a:latin typeface="Consolas" panose="020B0609020204030204" pitchFamily="49" charset="0"/>
               </a:rPr>
-              <a:t>ход</a:t>
-            </a:r>
-            <a:r>
-              <a:rPr lang="ru-RU" smtClean="0">
-                <a:latin typeface="Consolas" panose="020B0609020204030204" pitchFamily="49" charset="0"/>
-              </a:rPr>
-              <a:t>.</a:t>
+              <a:t>ход.</a:t>
             </a:r>
             <a:endParaRPr lang="en-US" smtClean="0">
               <a:latin typeface="Consolas" panose="020B0609020204030204" pitchFamily="49" charset="0"/>
@@ -7518,11 +7512,7 @@
             </a:r>
             <a:r>
               <a:rPr lang="ru-RU" smtClean="0"/>
-              <a:t>. </a:t>
-            </a:r>
-            <a:r>
-              <a:rPr lang="ru-RU" smtClean="0"/>
-              <a:t>Но </a:t>
+              <a:t>. Но </a:t>
             </a:r>
             <a:r>
               <a:rPr lang="ru-RU" dirty="0" smtClean="0"/>
@@ -7530,15 +7520,7 @@
             </a:r>
             <a:r>
               <a:rPr lang="ru-RU" smtClean="0"/>
-              <a:t>иногда </a:t>
-            </a:r>
-            <a:r>
-              <a:rPr lang="ru-RU" smtClean="0"/>
-              <a:t>ухудшающих </a:t>
-            </a:r>
-            <a:r>
-              <a:rPr lang="ru-RU" smtClean="0"/>
-              <a:t>его </a:t>
+              <a:t>иногда ухудшающих его </a:t>
             </a:r>
             <a:r>
               <a:rPr lang="ru-RU" dirty="0" smtClean="0"/>
@@ -7546,11 +7528,7 @@
             </a:r>
             <a:r>
               <a:rPr lang="ru-RU" smtClean="0"/>
-              <a:t>недостатков</a:t>
-            </a:r>
-            <a:r>
-              <a:rPr lang="ru-RU" smtClean="0"/>
-              <a:t>?</a:t>
+              <a:t>недостатков?</a:t>
             </a:r>
             <a:endParaRPr lang="ru-RU" dirty="0" smtClean="0"/>
           </a:p>
@@ -7636,11 +7614,7 @@
             </a:r>
             <a:r>
               <a:rPr lang="ru-RU" smtClean="0"/>
-              <a:t>. </a:t>
-            </a:r>
-            <a:r>
-              <a:rPr lang="ru-RU" smtClean="0"/>
-              <a:t>Но </a:t>
+              <a:t>. Но </a:t>
             </a:r>
             <a:r>
               <a:rPr lang="ru-RU" dirty="0" smtClean="0"/>
@@ -7648,15 +7622,7 @@
             </a:r>
             <a:r>
               <a:rPr lang="ru-RU" smtClean="0"/>
-              <a:t>иногда </a:t>
-            </a:r>
-            <a:r>
-              <a:rPr lang="ru-RU" smtClean="0"/>
-              <a:t>ухудшающих </a:t>
-            </a:r>
-            <a:r>
-              <a:rPr lang="ru-RU" smtClean="0"/>
-              <a:t>его </a:t>
+              <a:t>иногда ухудшающих его </a:t>
             </a:r>
             <a:r>
               <a:rPr lang="ru-RU" dirty="0" smtClean="0"/>
@@ -7664,11 +7630,7 @@
             </a:r>
             <a:r>
               <a:rPr lang="ru-RU" smtClean="0"/>
-              <a:t>недостатков</a:t>
-            </a:r>
-            <a:r>
-              <a:rPr lang="ru-RU" smtClean="0"/>
-              <a:t>?</a:t>
+              <a:t>недостатков?</a:t>
             </a:r>
           </a:p>
           <a:p>
@@ -9420,9 +9382,18 @@
           </a:p>
           <a:p>
             <a:r>
-              <a:rPr lang="ru-RU" dirty="0" smtClean="0"/>
-              <a:t>Адапторы</a:t>
-            </a:r>
+              <a:rPr lang="ru-RU" smtClean="0"/>
+              <a:t>Адапт</a:t>
+            </a:r>
+            <a:r>
+              <a:rPr lang="ru-RU"/>
+              <a:t>е</a:t>
+            </a:r>
+            <a:r>
+              <a:rPr lang="ru-RU" smtClean="0"/>
+              <a:t>ры</a:t>
+            </a:r>
+            <a:endParaRPr lang="ru-RU" dirty="0" smtClean="0"/>
           </a:p>
           <a:p>
             <a:pPr lvl="1"/>

</xml_diff>